<commit_message>
Power Point updated for presentation
</commit_message>
<xml_diff>
--- a/Ben & Jerry’s Random Comparisons.pptx
+++ b/Ben & Jerry’s Random Comparisons.pptx
@@ -12,7 +12,9 @@
     <p:sldId id="260" r:id="rId6"/>
     <p:sldId id="263" r:id="rId7"/>
     <p:sldId id="264" r:id="rId8"/>
-    <p:sldId id="262" r:id="rId9"/>
+    <p:sldId id="265" r:id="rId9"/>
+    <p:sldId id="266" r:id="rId10"/>
+    <p:sldId id="262" r:id="rId11"/>
   </p:sldIdLst>
   <p:sldSz cx="12192000" cy="6858000"/>
   <p:notesSz cx="6858000" cy="9144000"/>
@@ -3472,10 +3474,126 @@
           </a:p>
         </p:txBody>
       </p:sp>
+      <p:pic>
+        <p:nvPicPr>
+          <p:cNvPr id="5" name="Picture 4">
+            <a:extLst>
+              <a:ext uri="{FF2B5EF4-FFF2-40B4-BE49-F238E27FC236}">
+                <a16:creationId xmlns:a16="http://schemas.microsoft.com/office/drawing/2014/main" id="{64F28691-50E1-400D-8D22-4D497F2B7E05}"/>
+              </a:ext>
+            </a:extLst>
+          </p:cNvPr>
+          <p:cNvPicPr>
+            <a:picLocks noChangeAspect="1"/>
+          </p:cNvPicPr>
+          <p:nvPr/>
+        </p:nvPicPr>
+        <p:blipFill>
+          <a:blip r:embed="rId2"/>
+          <a:stretch>
+            <a:fillRect/>
+          </a:stretch>
+        </p:blipFill>
+        <p:spPr>
+          <a:xfrm>
+            <a:off x="4138361" y="0"/>
+            <a:ext cx="3562350" cy="4562475"/>
+          </a:xfrm>
+          <a:prstGeom prst="rect">
+            <a:avLst/>
+          </a:prstGeom>
+        </p:spPr>
+      </p:pic>
     </p:spTree>
     <p:extLst>
       <p:ext uri="{BB962C8B-B14F-4D97-AF65-F5344CB8AC3E}">
         <p14:creationId xmlns:p14="http://schemas.microsoft.com/office/powerpoint/2010/main" val="458817217"/>
+      </p:ext>
+    </p:extLst>
+  </p:cSld>
+  <p:clrMapOvr>
+    <a:masterClrMapping/>
+  </p:clrMapOvr>
+</p:sld>
+</file>
+
+<file path=ppt/slides/slide10.xml><?xml version="1.0" encoding="utf-8"?>
+<p:sld xmlns:a="http://schemas.openxmlformats.org/drawingml/2006/main" xmlns:r="http://schemas.openxmlformats.org/officeDocument/2006/relationships" xmlns:p="http://schemas.openxmlformats.org/presentationml/2006/main">
+  <p:cSld>
+    <p:spTree>
+      <p:nvGrpSpPr>
+        <p:cNvPr id="1" name=""/>
+        <p:cNvGrpSpPr/>
+        <p:nvPr/>
+      </p:nvGrpSpPr>
+      <p:grpSpPr>
+        <a:xfrm>
+          <a:off x="0" y="0"/>
+          <a:ext cx="0" cy="0"/>
+          <a:chOff x="0" y="0"/>
+          <a:chExt cx="0" cy="0"/>
+        </a:xfrm>
+      </p:grpSpPr>
+      <p:sp>
+        <p:nvSpPr>
+          <p:cNvPr id="2" name="Title 1">
+            <a:extLst>
+              <a:ext uri="{FF2B5EF4-FFF2-40B4-BE49-F238E27FC236}">
+                <a16:creationId xmlns:a16="http://schemas.microsoft.com/office/drawing/2014/main" id="{32ECB62A-728D-4481-B8A9-9A4131B5D5DA}"/>
+              </a:ext>
+            </a:extLst>
+          </p:cNvPr>
+          <p:cNvSpPr>
+            <a:spLocks noGrp="1"/>
+          </p:cNvSpPr>
+          <p:nvPr>
+            <p:ph type="title"/>
+          </p:nvPr>
+        </p:nvSpPr>
+        <p:spPr/>
+        <p:txBody>
+          <a:bodyPr/>
+          <a:lstStyle/>
+          <a:p>
+            <a:r>
+              <a:rPr lang="en-US" dirty="0"/>
+              <a:t>Appendix</a:t>
+            </a:r>
+          </a:p>
+        </p:txBody>
+      </p:sp>
+      <p:sp>
+        <p:nvSpPr>
+          <p:cNvPr id="3" name="Content Placeholder 2">
+            <a:extLst>
+              <a:ext uri="{FF2B5EF4-FFF2-40B4-BE49-F238E27FC236}">
+                <a16:creationId xmlns:a16="http://schemas.microsoft.com/office/drawing/2014/main" id="{FF516287-A7B1-41B9-A58C-9F9902F45533}"/>
+              </a:ext>
+            </a:extLst>
+          </p:cNvPr>
+          <p:cNvSpPr>
+            <a:spLocks noGrp="1"/>
+          </p:cNvSpPr>
+          <p:nvPr>
+            <p:ph idx="1"/>
+          </p:nvPr>
+        </p:nvSpPr>
+        <p:spPr/>
+        <p:txBody>
+          <a:bodyPr/>
+          <a:lstStyle/>
+          <a:p>
+            <a:r>
+              <a:rPr lang="en-US" dirty="0"/>
+              <a:t>Click to add text.</a:t>
+            </a:r>
+          </a:p>
+        </p:txBody>
+      </p:sp>
+    </p:spTree>
+    <p:extLst>
+      <p:ext uri="{BB962C8B-B14F-4D97-AF65-F5344CB8AC3E}">
+        <p14:creationId xmlns:p14="http://schemas.microsoft.com/office/powerpoint/2010/main" val="443825569"/>
       </p:ext>
     </p:extLst>
   </p:cSld>
@@ -4133,7 +4251,7 @@
           <p:cNvPr id="2" name="Title 1">
             <a:extLst>
               <a:ext uri="{FF2B5EF4-FFF2-40B4-BE49-F238E27FC236}">
-                <a16:creationId xmlns:a16="http://schemas.microsoft.com/office/drawing/2014/main" id="{32ECB62A-728D-4481-B8A9-9A4131B5D5DA}"/>
+                <a16:creationId xmlns:a16="http://schemas.microsoft.com/office/drawing/2014/main" id="{042E77A0-FB07-4BF6-897B-B7F36662A9B5}"/>
               </a:ext>
             </a:extLst>
           </p:cNvPr>
@@ -4151,40 +4269,187 @@
           <a:p>
             <a:r>
               <a:rPr lang="en-US" dirty="0"/>
-              <a:t>Appendix</a:t>
-            </a:r>
-          </a:p>
-        </p:txBody>
-      </p:sp>
-      <p:sp>
-        <p:nvSpPr>
-          <p:cNvPr id="3" name="Content Placeholder 2">
+              <a:t>Map of Ben &amp; Jerry’s Locations</a:t>
+            </a:r>
+          </a:p>
+        </p:txBody>
+      </p:sp>
+      <p:pic>
+        <p:nvPicPr>
+          <p:cNvPr id="6" name="Picture Placeholder 5">
             <a:extLst>
               <a:ext uri="{FF2B5EF4-FFF2-40B4-BE49-F238E27FC236}">
-                <a16:creationId xmlns:a16="http://schemas.microsoft.com/office/drawing/2014/main" id="{FF516287-A7B1-41B9-A58C-9F9902F45533}"/>
+                <a16:creationId xmlns:a16="http://schemas.microsoft.com/office/drawing/2014/main" id="{2567DF34-8FC5-4D3E-A528-45CC2CFEAEFD}"/>
               </a:ext>
             </a:extLst>
           </p:cNvPr>
-          <p:cNvSpPr>
-            <a:spLocks noGrp="1"/>
-          </p:cNvSpPr>
-          <p:nvPr>
-            <p:ph idx="1"/>
-          </p:nvPr>
-        </p:nvSpPr>
-        <p:spPr/>
-        <p:txBody>
-          <a:bodyPr/>
-          <a:lstStyle/>
-          <a:p>
-            <a:endParaRPr lang="en-US" dirty="0"/>
+          <p:cNvPicPr>
+            <a:picLocks noGrp="1" noChangeAspect="1"/>
+          </p:cNvPicPr>
+          <p:nvPr>
+            <p:ph type="pic" idx="1"/>
+          </p:nvPr>
+        </p:nvPicPr>
+        <p:blipFill>
+          <a:blip r:embed="rId2"/>
+          <a:srcRect t="16658" b="16658"/>
+          <a:stretch>
+            <a:fillRect/>
+          </a:stretch>
+        </p:blipFill>
+        <p:spPr/>
+      </p:pic>
+      <p:sp>
+        <p:nvSpPr>
+          <p:cNvPr id="4" name="Text Placeholder 3">
+            <a:extLst>
+              <a:ext uri="{FF2B5EF4-FFF2-40B4-BE49-F238E27FC236}">
+                <a16:creationId xmlns:a16="http://schemas.microsoft.com/office/drawing/2014/main" id="{011D1DAD-8770-487D-A7D9-BF9CFA873EA5}"/>
+              </a:ext>
+            </a:extLst>
+          </p:cNvPr>
+          <p:cNvSpPr>
+            <a:spLocks noGrp="1"/>
+          </p:cNvSpPr>
+          <p:nvPr>
+            <p:ph type="body" sz="half" idx="2"/>
+          </p:nvPr>
+        </p:nvSpPr>
+        <p:spPr/>
+        <p:txBody>
+          <a:bodyPr>
+            <a:normAutofit fontScale="92500"/>
+          </a:bodyPr>
+          <a:lstStyle/>
+          <a:p>
+            <a:r>
+              <a:rPr lang="en-US" dirty="0"/>
+              <a:t>Currently this map just shows the locations of Ben &amp; Jerry’s Ice Cream stores. Had there been more time, this would be layered over a heatmap of UFO sightings. </a:t>
+            </a:r>
           </a:p>
         </p:txBody>
       </p:sp>
     </p:spTree>
     <p:extLst>
       <p:ext uri="{BB962C8B-B14F-4D97-AF65-F5344CB8AC3E}">
-        <p14:creationId xmlns:p14="http://schemas.microsoft.com/office/powerpoint/2010/main" val="443825569"/>
+        <p14:creationId xmlns:p14="http://schemas.microsoft.com/office/powerpoint/2010/main" val="2711314308"/>
+      </p:ext>
+    </p:extLst>
+  </p:cSld>
+  <p:clrMapOvr>
+    <a:masterClrMapping/>
+  </p:clrMapOvr>
+</p:sld>
+</file>
+
+<file path=ppt/slides/slide9.xml><?xml version="1.0" encoding="utf-8"?>
+<p:sld xmlns:a="http://schemas.openxmlformats.org/drawingml/2006/main" xmlns:r="http://schemas.openxmlformats.org/officeDocument/2006/relationships" xmlns:p="http://schemas.openxmlformats.org/presentationml/2006/main">
+  <p:cSld>
+    <p:spTree>
+      <p:nvGrpSpPr>
+        <p:cNvPr id="1" name=""/>
+        <p:cNvGrpSpPr/>
+        <p:nvPr/>
+      </p:nvGrpSpPr>
+      <p:grpSpPr>
+        <a:xfrm>
+          <a:off x="0" y="0"/>
+          <a:ext cx="0" cy="0"/>
+          <a:chOff x="0" y="0"/>
+          <a:chExt cx="0" cy="0"/>
+        </a:xfrm>
+      </p:grpSpPr>
+      <p:sp>
+        <p:nvSpPr>
+          <p:cNvPr id="2" name="Title 1">
+            <a:extLst>
+              <a:ext uri="{FF2B5EF4-FFF2-40B4-BE49-F238E27FC236}">
+                <a16:creationId xmlns:a16="http://schemas.microsoft.com/office/drawing/2014/main" id="{4512D194-4DF4-47E3-9687-23F265BAA239}"/>
+              </a:ext>
+            </a:extLst>
+          </p:cNvPr>
+          <p:cNvSpPr>
+            <a:spLocks noGrp="1"/>
+          </p:cNvSpPr>
+          <p:nvPr>
+            <p:ph type="title"/>
+          </p:nvPr>
+        </p:nvSpPr>
+        <p:spPr/>
+        <p:txBody>
+          <a:bodyPr/>
+          <a:lstStyle/>
+          <a:p>
+            <a:r>
+              <a:rPr lang="en-US" dirty="0"/>
+              <a:t>Time for Ice Cream</a:t>
+            </a:r>
+          </a:p>
+        </p:txBody>
+      </p:sp>
+      <p:pic>
+        <p:nvPicPr>
+          <p:cNvPr id="6" name="Picture Placeholder 5">
+            <a:extLst>
+              <a:ext uri="{FF2B5EF4-FFF2-40B4-BE49-F238E27FC236}">
+                <a16:creationId xmlns:a16="http://schemas.microsoft.com/office/drawing/2014/main" id="{CA1B32E9-18BF-4875-B1F8-8ACB89E4E62B}"/>
+              </a:ext>
+            </a:extLst>
+          </p:cNvPr>
+          <p:cNvPicPr>
+            <a:picLocks noGrp="1" noChangeAspect="1"/>
+          </p:cNvPicPr>
+          <p:nvPr>
+            <p:ph type="pic" idx="1"/>
+          </p:nvPr>
+        </p:nvPicPr>
+        <p:blipFill>
+          <a:blip r:embed="rId2"/>
+          <a:srcRect t="21840" b="21840"/>
+          <a:stretch>
+            <a:fillRect/>
+          </a:stretch>
+        </p:blipFill>
+        <p:spPr/>
+      </p:pic>
+      <p:sp>
+        <p:nvSpPr>
+          <p:cNvPr id="4" name="Text Placeholder 3">
+            <a:extLst>
+              <a:ext uri="{FF2B5EF4-FFF2-40B4-BE49-F238E27FC236}">
+                <a16:creationId xmlns:a16="http://schemas.microsoft.com/office/drawing/2014/main" id="{F259B9FB-8101-41B6-B600-A00531302DE9}"/>
+              </a:ext>
+            </a:extLst>
+          </p:cNvPr>
+          <p:cNvSpPr>
+            <a:spLocks noGrp="1"/>
+          </p:cNvSpPr>
+          <p:nvPr>
+            <p:ph type="body" sz="half" idx="2"/>
+          </p:nvPr>
+        </p:nvSpPr>
+        <p:spPr/>
+        <p:txBody>
+          <a:bodyPr/>
+          <a:lstStyle/>
+          <a:p>
+            <a:r>
+              <a:rPr lang="en-US" dirty="0"/>
+              <a:t>Yeah.</a:t>
+            </a:r>
+          </a:p>
+          <a:p>
+            <a:r>
+              <a:rPr lang="en-US" dirty="0"/>
+              <a:t>We Brought Ben &amp; Jerry’s for everyone.</a:t>
+            </a:r>
+          </a:p>
+        </p:txBody>
+      </p:sp>
+    </p:spTree>
+    <p:extLst>
+      <p:ext uri="{BB962C8B-B14F-4D97-AF65-F5344CB8AC3E}">
+        <p14:creationId xmlns:p14="http://schemas.microsoft.com/office/powerpoint/2010/main" val="2121892002"/>
       </p:ext>
     </p:extLst>
   </p:cSld>

</xml_diff>